<commit_message>
Added Course Materials - Day 2
</commit_message>
<xml_diff>
--- a/1. Foundation Oracle SQL/Day 1/Slides/1. Retrieving Data Using The Select Statement/retrieving-data-using-the-select-statement-slides.pptx
+++ b/1. Foundation Oracle SQL/Day 1/Slides/1. Retrieving Data Using The Select Statement/retrieving-data-using-the-select-statement-slides.pptx
@@ -3018,48 +3018,6 @@
           </a:p>
           <a:p>
             <a:pPr lvl="2" indent="-228600"/>
-            <a:endParaRPr lang="en-US"/>
-          </a:p>
-          <a:p>
-            <a:pPr lvl="2" indent="-228600"/>
-            <a:endParaRPr lang="en-US"/>
-          </a:p>
-          <a:p>
-            <a:pPr lvl="2" indent="-228600"/>
-            <a:endParaRPr lang="en-US"/>
-          </a:p>
-          <a:p>
-            <a:pPr lvl="2" indent="-228600"/>
-            <a:endParaRPr lang="en-US"/>
-          </a:p>
-          <a:p>
-            <a:pPr lvl="2" indent="-228600"/>
-            <a:endParaRPr lang="en-US"/>
-          </a:p>
-          <a:p>
-            <a:pPr lvl="2" indent="-228600"/>
-            <a:endParaRPr lang="en-US"/>
-          </a:p>
-          <a:p>
-            <a:pPr lvl="2" indent="-228600"/>
-            <a:endParaRPr lang="en-US"/>
-          </a:p>
-          <a:p>
-            <a:pPr lvl="2" indent="-228600"/>
-            <a:endParaRPr lang="en-US"/>
-          </a:p>
-          <a:p>
-            <a:pPr lvl="2" indent="-228600"/>
-            <a:endParaRPr lang="en-US"/>
-          </a:p>
-          <a:p>
-            <a:pPr lvl="2" indent="-228600"/>
-            <a:endParaRPr lang="en-US"/>
-          </a:p>
-          <a:p>
-            <a:pPr lvl="2" indent="-228600">
-              <a:buNone/>
-            </a:pPr>
             <a:r>
               <a:rPr lang="en-US"/>
               <a:t>7.	You need to determine the structure of the </a:t>

</xml_diff>